<commit_message>
Minor fixes in translation
</commit_message>
<xml_diff>
--- a/Courses/Software-Sciences/Module-1-OOP-New/15-Design-Patterns/15-Design-Patterns.pptx
+++ b/Courses/Software-Sciences/Module-1-OOP-New/15-Design-Patterns/15-Design-Patterns.pptx
@@ -179,7 +179,7 @@
             <p14:sldId id="495"/>
           </p14:sldIdLst>
         </p14:section>
-        <p14:section name="Creational шаблони" id="{9245A61C-C383-496A-8C32-90D8A4D551CE}">
+        <p14:section name="Шаблони за създаване" id="{9245A61C-C383-496A-8C32-90D8A4D551CE}">
           <p14:sldIdLst>
             <p14:sldId id="303"/>
             <p14:sldId id="304"/>
@@ -191,7 +191,7 @@
             <p14:sldId id="310"/>
           </p14:sldIdLst>
         </p14:section>
-        <p14:section name="Structural шаблони" id="{264A1D7D-1B6E-4C7C-A3A7-401F58145BC7}">
+        <p14:section name="Структурни шаблони" id="{264A1D7D-1B6E-4C7C-A3A7-401F58145BC7}">
           <p14:sldIdLst>
             <p14:sldId id="311"/>
             <p14:sldId id="312"/>
@@ -207,7 +207,7 @@
             <p14:sldId id="322"/>
           </p14:sldIdLst>
         </p14:section>
-        <p14:section name="Behavioral шаблони" id="{33DDB4CA-31A3-437D-9DAC-6302010EA2AC}">
+        <p14:section name="Поведенчески шаблони" id="{33DDB4CA-31A3-437D-9DAC-6302010EA2AC}">
           <p14:sldIdLst>
             <p14:sldId id="323"/>
             <p14:sldId id="324"/>
@@ -347,7 +347,7 @@
           <a:p>
             <a:fld id="{4E087215-0C8F-4762-A664-737A353EC9A4}" type="datetimeFigureOut">
               <a:rPr lang="bg-BG" smtClean="0"/>
-              <a:t>13.1.2023 г.</a:t>
+              <a:t>18.01.23 г.</a:t>
             </a:fld>
             <a:endParaRPr lang="bg-BG"/>
           </a:p>
@@ -538,7 +538,7 @@
           <a:p>
             <a:fld id="{72D84649-876A-46C9-8472-14CB09C070D8}" type="datetimeFigureOut">
               <a:rPr lang="en-US" smtClean="0"/>
-              <a:t>13-Jan-23</a:t>
+              <a:t>1/18/23</a:t>
             </a:fld>
             <a:endParaRPr lang="en-US"/>
           </a:p>
@@ -1025,7 +1025,7 @@
           <a:p>
             <a:fld id="{2BF067CD-8E6B-4360-9AA8-C5DF2A48A6D1}" type="slidenum">
               <a:rPr lang="en-US" smtClean="0"/>
-              <a:t>22</a:t>
+              <a:t>21</a:t>
             </a:fld>
             <a:endParaRPr lang="en-US" dirty="0"/>
           </a:p>
@@ -1067,7 +1067,7 @@
     </p:spTree>
     <p:extLst>
       <p:ext uri="{BB962C8B-B14F-4D97-AF65-F5344CB8AC3E}">
-        <p14:creationId xmlns:p14="http://schemas.microsoft.com/office/powerpoint/2010/main" val="1406144760"/>
+        <p14:creationId xmlns:p14="http://schemas.microsoft.com/office/powerpoint/2010/main" val="3047481589"/>
       </p:ext>
     </p:extLst>
   </p:cSld>
@@ -1121,7 +1121,7 @@
           <a:bodyPr/>
           <a:lstStyle/>
           <a:p>
-            <a:endParaRPr lang="en-US" dirty="0"/>
+            <a:endParaRPr lang="en-BG" dirty="0"/>
           </a:p>
         </p:txBody>
       </p:sp>
@@ -1132,7 +1132,7 @@
             <a:spLocks noGrp="1"/>
           </p:cNvSpPr>
           <p:nvPr>
-            <p:ph type="sldNum" sz="quarter" idx="10"/>
+            <p:ph type="sldNum" sz="quarter" idx="5"/>
           </p:nvPr>
         </p:nvSpPr>
         <p:spPr/>
@@ -1140,10 +1140,9 @@
           <a:bodyPr/>
           <a:lstStyle/>
           <a:p>
-            <a:fld id="{3EBA5BD7-F043-4D1B-AA17-CD412FC534DE}" type="slidenum">
+            <a:fld id="{2BF067CD-8E6B-4360-9AA8-C5DF2A48A6D1}" type="slidenum">
               <a:rPr lang="en-US" smtClean="0"/>
-              <a:pPr/>
-              <a:t>31</a:t>
+              <a:t>22</a:t>
             </a:fld>
             <a:endParaRPr lang="en-US" dirty="0"/>
           </a:p>
@@ -1151,13 +1150,7 @@
       </p:sp>
       <p:sp>
         <p:nvSpPr>
-          <p:cNvPr id="6" name="Footer Placeholder 7">
-            <a:extLst>
-              <a:ext uri="{FF2B5EF4-FFF2-40B4-BE49-F238E27FC236}">
-                <a16:creationId xmlns:a16="http://schemas.microsoft.com/office/drawing/2014/main" id="{88DC02A7-7D70-4E63-8E2D-381DBEC499A1}"/>
-              </a:ext>
-            </a:extLst>
-          </p:cNvPr>
+          <p:cNvPr id="5" name="Footer Placeholder 4"/>
           <p:cNvSpPr>
             <a:spLocks noGrp="1"/>
           </p:cNvSpPr>
@@ -1165,44 +1158,33 @@
             <p:ph type="ftr" sz="quarter" idx="4"/>
           </p:nvPr>
         </p:nvSpPr>
-        <p:spPr>
-          <a:xfrm>
-            <a:off x="-1" y="8847000"/>
-            <a:ext cx="6488999" cy="297000"/>
-          </a:xfrm>
-          <a:prstGeom prst="rect">
-            <a:avLst/>
-          </a:prstGeom>
-        </p:spPr>
+        <p:spPr/>
         <p:txBody>
-          <a:bodyPr vert="horz" lIns="91440" tIns="45720" rIns="91440" bIns="45720" rtlCol="0" anchor="b"/>
-          <a:lstStyle>
-            <a:lvl1pPr algn="l">
-              <a:defRPr sz="1100"/>
-            </a:lvl1pPr>
-          </a:lstStyle>
-          <a:p>
-            <a:r>
-              <a:rPr lang="en-US" dirty="0"/>
+          <a:bodyPr/>
+          <a:lstStyle/>
+          <a:p>
+            <a:r>
+              <a:rPr lang="en-US"/>
               <a:t>© SoftUni – </a:t>
             </a:r>
             <a:r>
-              <a:rPr lang="en-US" u="sng" dirty="0">
+              <a:rPr lang="en-US" u="sng">
                 <a:hlinkClick r:id="rId3"/>
               </a:rPr>
               <a:t>https://softuni.org</a:t>
             </a:r>
             <a:r>
-              <a:rPr lang="en-US" dirty="0"/>
+              <a:rPr lang="en-US"/>
               <a:t>. Copyrighted document. Unauthorized copy or reproduction is not permitted.</a:t>
             </a:r>
+            <a:endParaRPr lang="en-US" dirty="0"/>
           </a:p>
         </p:txBody>
       </p:sp>
     </p:spTree>
     <p:extLst>
       <p:ext uri="{BB962C8B-B14F-4D97-AF65-F5344CB8AC3E}">
-        <p14:creationId xmlns:p14="http://schemas.microsoft.com/office/powerpoint/2010/main" val="1778616773"/>
+        <p14:creationId xmlns:p14="http://schemas.microsoft.com/office/powerpoint/2010/main" val="1406144760"/>
       </p:ext>
     </p:extLst>
   </p:cSld>
@@ -1256,7 +1238,7 @@
           <a:bodyPr/>
           <a:lstStyle/>
           <a:p>
-            <a:endParaRPr lang="en-BG" dirty="0"/>
+            <a:endParaRPr lang="en-US" dirty="0"/>
           </a:p>
         </p:txBody>
       </p:sp>
@@ -1267,7 +1249,7 @@
             <a:spLocks noGrp="1"/>
           </p:cNvSpPr>
           <p:nvPr>
-            <p:ph type="sldNum" sz="quarter" idx="5"/>
+            <p:ph type="sldNum" sz="quarter" idx="10"/>
           </p:nvPr>
         </p:nvSpPr>
         <p:spPr/>
@@ -1275,9 +1257,10 @@
           <a:bodyPr/>
           <a:lstStyle/>
           <a:p>
-            <a:fld id="{2BF067CD-8E6B-4360-9AA8-C5DF2A48A6D1}" type="slidenum">
+            <a:fld id="{3EBA5BD7-F043-4D1B-AA17-CD412FC534DE}" type="slidenum">
               <a:rPr lang="en-US" smtClean="0"/>
-              <a:t>32</a:t>
+              <a:pPr/>
+              <a:t>31</a:t>
             </a:fld>
             <a:endParaRPr lang="en-US" dirty="0"/>
           </a:p>
@@ -1285,7 +1268,13 @@
       </p:sp>
       <p:sp>
         <p:nvSpPr>
-          <p:cNvPr id="5" name="Footer Placeholder 4"/>
+          <p:cNvPr id="6" name="Footer Placeholder 7">
+            <a:extLst>
+              <a:ext uri="{FF2B5EF4-FFF2-40B4-BE49-F238E27FC236}">
+                <a16:creationId xmlns:a16="http://schemas.microsoft.com/office/drawing/2014/main" id="{88DC02A7-7D70-4E63-8E2D-381DBEC499A1}"/>
+              </a:ext>
+            </a:extLst>
+          </p:cNvPr>
           <p:cNvSpPr>
             <a:spLocks noGrp="1"/>
           </p:cNvSpPr>
@@ -1293,33 +1282,44 @@
             <p:ph type="ftr" sz="quarter" idx="4"/>
           </p:nvPr>
         </p:nvSpPr>
-        <p:spPr/>
+        <p:spPr>
+          <a:xfrm>
+            <a:off x="-1" y="8847000"/>
+            <a:ext cx="6488999" cy="297000"/>
+          </a:xfrm>
+          <a:prstGeom prst="rect">
+            <a:avLst/>
+          </a:prstGeom>
+        </p:spPr>
         <p:txBody>
-          <a:bodyPr/>
-          <a:lstStyle/>
-          <a:p>
-            <a:r>
-              <a:rPr lang="en-US"/>
+          <a:bodyPr vert="horz" lIns="91440" tIns="45720" rIns="91440" bIns="45720" rtlCol="0" anchor="b"/>
+          <a:lstStyle>
+            <a:lvl1pPr algn="l">
+              <a:defRPr sz="1100"/>
+            </a:lvl1pPr>
+          </a:lstStyle>
+          <a:p>
+            <a:r>
+              <a:rPr lang="en-US" dirty="0"/>
               <a:t>© SoftUni – </a:t>
             </a:r>
             <a:r>
-              <a:rPr lang="en-US" u="sng">
+              <a:rPr lang="en-US" u="sng" dirty="0">
                 <a:hlinkClick r:id="rId3"/>
               </a:rPr>
               <a:t>https://softuni.org</a:t>
             </a:r>
             <a:r>
-              <a:rPr lang="en-US"/>
+              <a:rPr lang="en-US" dirty="0"/>
               <a:t>. Copyrighted document. Unauthorized copy or reproduction is not permitted.</a:t>
             </a:r>
-            <a:endParaRPr lang="en-US" dirty="0"/>
           </a:p>
         </p:txBody>
       </p:sp>
     </p:spTree>
     <p:extLst>
       <p:ext uri="{BB962C8B-B14F-4D97-AF65-F5344CB8AC3E}">
-        <p14:creationId xmlns:p14="http://schemas.microsoft.com/office/powerpoint/2010/main" val="1542359863"/>
+        <p14:creationId xmlns:p14="http://schemas.microsoft.com/office/powerpoint/2010/main" val="1778616773"/>
       </p:ext>
     </p:extLst>
   </p:cSld>
@@ -1394,7 +1394,7 @@
           <a:p>
             <a:fld id="{2BF067CD-8E6B-4360-9AA8-C5DF2A48A6D1}" type="slidenum">
               <a:rPr lang="en-US" smtClean="0"/>
-              <a:t>35</a:t>
+              <a:t>32</a:t>
             </a:fld>
             <a:endParaRPr lang="en-US" dirty="0"/>
           </a:p>
@@ -1436,7 +1436,7 @@
     </p:spTree>
     <p:extLst>
       <p:ext uri="{BB962C8B-B14F-4D97-AF65-F5344CB8AC3E}">
-        <p14:creationId xmlns:p14="http://schemas.microsoft.com/office/powerpoint/2010/main" val="3124796468"/>
+        <p14:creationId xmlns:p14="http://schemas.microsoft.com/office/powerpoint/2010/main" val="1542359863"/>
       </p:ext>
     </p:extLst>
   </p:cSld>
@@ -1490,18 +1490,18 @@
           <a:bodyPr/>
           <a:lstStyle/>
           <a:p>
-            <a:endParaRPr lang="en-US" dirty="0"/>
+            <a:endParaRPr lang="en-BG" dirty="0"/>
           </a:p>
         </p:txBody>
       </p:sp>
       <p:sp>
         <p:nvSpPr>
-          <p:cNvPr id="5" name="Slide Number Placeholder 4"/>
+          <p:cNvPr id="4" name="Slide Number Placeholder 3"/>
           <p:cNvSpPr>
             <a:spLocks noGrp="1"/>
           </p:cNvSpPr>
           <p:nvPr>
-            <p:ph type="sldNum" sz="quarter" idx="11"/>
+            <p:ph type="sldNum" sz="quarter" idx="5"/>
           </p:nvPr>
         </p:nvSpPr>
         <p:spPr/>
@@ -1509,10 +1509,9 @@
           <a:bodyPr/>
           <a:lstStyle/>
           <a:p>
-            <a:fld id="{3EBA5BD7-F043-4D1B-AA17-CD412FC534DE}" type="slidenum">
+            <a:fld id="{2BF067CD-8E6B-4360-9AA8-C5DF2A48A6D1}" type="slidenum">
               <a:rPr lang="en-US" smtClean="0"/>
-              <a:pPr/>
-              <a:t>43</a:t>
+              <a:t>35</a:t>
             </a:fld>
             <a:endParaRPr lang="en-US" dirty="0"/>
           </a:p>
@@ -1520,13 +1519,7 @@
       </p:sp>
       <p:sp>
         <p:nvSpPr>
-          <p:cNvPr id="6" name="Footer Placeholder 7">
-            <a:extLst>
-              <a:ext uri="{FF2B5EF4-FFF2-40B4-BE49-F238E27FC236}">
-                <a16:creationId xmlns:a16="http://schemas.microsoft.com/office/drawing/2014/main" id="{54A34148-6056-478C-9CDD-88D6360416CE}"/>
-              </a:ext>
-            </a:extLst>
-          </p:cNvPr>
+          <p:cNvPr id="5" name="Footer Placeholder 4"/>
           <p:cNvSpPr>
             <a:spLocks noGrp="1"/>
           </p:cNvSpPr>
@@ -1534,44 +1527,33 @@
             <p:ph type="ftr" sz="quarter" idx="4"/>
           </p:nvPr>
         </p:nvSpPr>
-        <p:spPr>
-          <a:xfrm>
-            <a:off x="-1" y="8847000"/>
-            <a:ext cx="6488999" cy="297000"/>
-          </a:xfrm>
-          <a:prstGeom prst="rect">
-            <a:avLst/>
-          </a:prstGeom>
-        </p:spPr>
+        <p:spPr/>
         <p:txBody>
-          <a:bodyPr vert="horz" lIns="91440" tIns="45720" rIns="91440" bIns="45720" rtlCol="0" anchor="b"/>
-          <a:lstStyle>
-            <a:lvl1pPr algn="l">
-              <a:defRPr sz="1100"/>
-            </a:lvl1pPr>
-          </a:lstStyle>
-          <a:p>
-            <a:r>
-              <a:rPr lang="en-US" dirty="0"/>
+          <a:bodyPr/>
+          <a:lstStyle/>
+          <a:p>
+            <a:r>
+              <a:rPr lang="en-US"/>
               <a:t>© SoftUni – </a:t>
             </a:r>
             <a:r>
-              <a:rPr lang="en-US" u="sng" dirty="0">
+              <a:rPr lang="en-US" u="sng">
                 <a:hlinkClick r:id="rId3"/>
               </a:rPr>
               <a:t>https://softuni.org</a:t>
             </a:r>
             <a:r>
-              <a:rPr lang="en-US" dirty="0"/>
+              <a:rPr lang="en-US"/>
               <a:t>. Copyrighted document. Unauthorized copy or reproduction is not permitted.</a:t>
             </a:r>
+            <a:endParaRPr lang="en-US" dirty="0"/>
           </a:p>
         </p:txBody>
       </p:sp>
     </p:spTree>
     <p:extLst>
       <p:ext uri="{BB962C8B-B14F-4D97-AF65-F5344CB8AC3E}">
-        <p14:creationId xmlns:p14="http://schemas.microsoft.com/office/powerpoint/2010/main" val="2071545545"/>
+        <p14:creationId xmlns:p14="http://schemas.microsoft.com/office/powerpoint/2010/main" val="3124796468"/>
       </p:ext>
     </p:extLst>
   </p:cSld>
@@ -1631,6 +1613,141 @@
       </p:sp>
       <p:sp>
         <p:nvSpPr>
+          <p:cNvPr id="5" name="Slide Number Placeholder 4"/>
+          <p:cNvSpPr>
+            <a:spLocks noGrp="1"/>
+          </p:cNvSpPr>
+          <p:nvPr>
+            <p:ph type="sldNum" sz="quarter" idx="11"/>
+          </p:nvPr>
+        </p:nvSpPr>
+        <p:spPr/>
+        <p:txBody>
+          <a:bodyPr/>
+          <a:lstStyle/>
+          <a:p>
+            <a:fld id="{3EBA5BD7-F043-4D1B-AA17-CD412FC534DE}" type="slidenum">
+              <a:rPr lang="en-US" smtClean="0"/>
+              <a:pPr/>
+              <a:t>43</a:t>
+            </a:fld>
+            <a:endParaRPr lang="en-US" dirty="0"/>
+          </a:p>
+        </p:txBody>
+      </p:sp>
+      <p:sp>
+        <p:nvSpPr>
+          <p:cNvPr id="6" name="Footer Placeholder 7">
+            <a:extLst>
+              <a:ext uri="{FF2B5EF4-FFF2-40B4-BE49-F238E27FC236}">
+                <a16:creationId xmlns:a16="http://schemas.microsoft.com/office/drawing/2014/main" id="{54A34148-6056-478C-9CDD-88D6360416CE}"/>
+              </a:ext>
+            </a:extLst>
+          </p:cNvPr>
+          <p:cNvSpPr>
+            <a:spLocks noGrp="1"/>
+          </p:cNvSpPr>
+          <p:nvPr>
+            <p:ph type="ftr" sz="quarter" idx="4"/>
+          </p:nvPr>
+        </p:nvSpPr>
+        <p:spPr>
+          <a:xfrm>
+            <a:off x="-1" y="8847000"/>
+            <a:ext cx="6488999" cy="297000"/>
+          </a:xfrm>
+          <a:prstGeom prst="rect">
+            <a:avLst/>
+          </a:prstGeom>
+        </p:spPr>
+        <p:txBody>
+          <a:bodyPr vert="horz" lIns="91440" tIns="45720" rIns="91440" bIns="45720" rtlCol="0" anchor="b"/>
+          <a:lstStyle>
+            <a:lvl1pPr algn="l">
+              <a:defRPr sz="1100"/>
+            </a:lvl1pPr>
+          </a:lstStyle>
+          <a:p>
+            <a:r>
+              <a:rPr lang="en-US" dirty="0"/>
+              <a:t>© SoftUni – </a:t>
+            </a:r>
+            <a:r>
+              <a:rPr lang="en-US" u="sng" dirty="0">
+                <a:hlinkClick r:id="rId3"/>
+              </a:rPr>
+              <a:t>https://softuni.org</a:t>
+            </a:r>
+            <a:r>
+              <a:rPr lang="en-US" dirty="0"/>
+              <a:t>. Copyrighted document. Unauthorized copy or reproduction is not permitted.</a:t>
+            </a:r>
+          </a:p>
+        </p:txBody>
+      </p:sp>
+    </p:spTree>
+    <p:extLst>
+      <p:ext uri="{BB962C8B-B14F-4D97-AF65-F5344CB8AC3E}">
+        <p14:creationId xmlns:p14="http://schemas.microsoft.com/office/powerpoint/2010/main" val="2071545545"/>
+      </p:ext>
+    </p:extLst>
+  </p:cSld>
+  <p:clrMapOvr>
+    <a:masterClrMapping/>
+  </p:clrMapOvr>
+</p:notes>
+</file>
+
+<file path=ppt/notesSlides/notesSlide16.xml><?xml version="1.0" encoding="utf-8"?>
+<p:notes xmlns:a="http://schemas.openxmlformats.org/drawingml/2006/main" xmlns:r="http://schemas.openxmlformats.org/officeDocument/2006/relationships" xmlns:p="http://schemas.openxmlformats.org/presentationml/2006/main">
+  <p:cSld>
+    <p:spTree>
+      <p:nvGrpSpPr>
+        <p:cNvPr id="1" name=""/>
+        <p:cNvGrpSpPr/>
+        <p:nvPr/>
+      </p:nvGrpSpPr>
+      <p:grpSpPr>
+        <a:xfrm>
+          <a:off x="0" y="0"/>
+          <a:ext cx="0" cy="0"/>
+          <a:chOff x="0" y="0"/>
+          <a:chExt cx="0" cy="0"/>
+        </a:xfrm>
+      </p:grpSpPr>
+      <p:sp>
+        <p:nvSpPr>
+          <p:cNvPr id="2" name="Slide Image Placeholder 1"/>
+          <p:cNvSpPr>
+            <a:spLocks noGrp="1" noRot="1" noChangeAspect="1"/>
+          </p:cNvSpPr>
+          <p:nvPr>
+            <p:ph type="sldImg"/>
+          </p:nvPr>
+        </p:nvSpPr>
+        <p:spPr/>
+      </p:sp>
+      <p:sp>
+        <p:nvSpPr>
+          <p:cNvPr id="3" name="Notes Placeholder 2"/>
+          <p:cNvSpPr>
+            <a:spLocks noGrp="1"/>
+          </p:cNvSpPr>
+          <p:nvPr>
+            <p:ph type="body" idx="1"/>
+          </p:nvPr>
+        </p:nvSpPr>
+        <p:spPr/>
+        <p:txBody>
+          <a:bodyPr/>
+          <a:lstStyle/>
+          <a:p>
+            <a:endParaRPr lang="en-US" dirty="0"/>
+          </a:p>
+        </p:txBody>
+      </p:sp>
+      <p:sp>
+        <p:nvSpPr>
           <p:cNvPr id="7" name="Slide Number Placeholder 5">
             <a:extLst>
               <a:ext uri="{FF2B5EF4-FFF2-40B4-BE49-F238E27FC236}">
@@ -1822,7 +1939,7 @@
 </p:notes>
 </file>
 
-<file path=ppt/notesSlides/notesSlide16.xml><?xml version="1.0" encoding="utf-8"?>
+<file path=ppt/notesSlides/notesSlide17.xml><?xml version="1.0" encoding="utf-8"?>
 <p:notes xmlns:a="http://schemas.openxmlformats.org/drawingml/2006/main" xmlns:r="http://schemas.openxmlformats.org/officeDocument/2006/relationships" xmlns:p="http://schemas.openxmlformats.org/presentationml/2006/main">
   <p:cSld>
     <p:spTree>
@@ -9965,12 +10082,8 @@
           <a:lstStyle/>
           <a:p>
             <a:r>
-              <a:rPr lang="en-GB" dirty="0"/>
-              <a:t>Creational </a:t>
-            </a:r>
-            <a:r>
               <a:rPr lang="bg-BG" dirty="0"/>
-              <a:t>шаблони</a:t>
+              <a:t>Шаблони за създаване</a:t>
             </a:r>
             <a:endParaRPr lang="en-GB" dirty="0"/>
           </a:p>
@@ -10663,15 +10776,7 @@
           <a:p>
             <a:r>
               <a:rPr lang="bg-BG" dirty="0"/>
-              <a:t>Списък с </a:t>
-            </a:r>
-            <a:r>
-              <a:rPr lang="en-US" dirty="0"/>
-              <a:t>Creational </a:t>
-            </a:r>
-            <a:r>
-              <a:rPr lang="bg-BG" dirty="0"/>
-              <a:t>шаблони</a:t>
+              <a:t>Списък с шаблони за създаване</a:t>
             </a:r>
           </a:p>
         </p:txBody>
@@ -11479,11 +11584,11 @@
             </a:r>
             <a:r>
               <a:rPr lang="en-GB" sz="3600" dirty="0"/>
-              <a:t> creational </a:t>
+              <a:t> </a:t>
             </a:r>
             <a:r>
               <a:rPr lang="bg-BG" sz="3600" dirty="0"/>
-              <a:t>шаблони за дизайн</a:t>
+              <a:t>шаблон за създаване</a:t>
             </a:r>
             <a:endParaRPr lang="en-GB" sz="3600" dirty="0"/>
           </a:p>
@@ -13764,8 +13869,12 @@
           <a:lstStyle/>
           <a:p>
             <a:r>
+              <a:rPr lang="bg-BG" dirty="0"/>
+              <a:t>Структурни</a:t>
+            </a:r>
+            <a:r>
               <a:rPr lang="en-GB" dirty="0"/>
-              <a:t>Structural </a:t>
+              <a:t> </a:t>
             </a:r>
             <a:r>
               <a:rPr lang="bg-BG" dirty="0"/>
@@ -14821,7 +14930,15 @@
             </a:r>
             <a:r>
               <a:rPr lang="en-US" dirty="0"/>
-              <a:t> Structural </a:t>
+              <a:t> </a:t>
+            </a:r>
+            <a:r>
+              <a:rPr lang="bg-BG" dirty="0"/>
+              <a:t>структурни</a:t>
+            </a:r>
+            <a:r>
+              <a:rPr lang="en-US" dirty="0"/>
+              <a:t> </a:t>
             </a:r>
             <a:r>
               <a:rPr lang="bg-BG" dirty="0"/>
@@ -14839,7 +14956,7 @@
           <p:nvPr/>
         </p:nvPicPr>
         <p:blipFill>
-          <a:blip r:embed="rId2">
+          <a:blip r:embed="rId3">
             <a:extLst>
               <a:ext uri="{28A0092B-C50C-407E-A947-70E740481C1C}">
                 <a14:useLocalDpi xmlns:a14="http://schemas.microsoft.com/office/drawing/2010/main"/>
@@ -14875,7 +14992,7 @@
           <p:nvPr/>
         </p:nvPicPr>
         <p:blipFill>
-          <a:blip r:embed="rId3"/>
+          <a:blip r:embed="rId4"/>
           <a:stretch>
             <a:fillRect/>
           </a:stretch>
@@ -14904,7 +15021,7 @@
           <p:nvPr/>
         </p:nvPicPr>
         <p:blipFill>
-          <a:blip r:embed="rId4">
+          <a:blip r:embed="rId5">
             <a:extLst>
               <a:ext uri="{28A0092B-C50C-407E-A947-70E740481C1C}">
                 <a14:useLocalDpi xmlns:a14="http://schemas.microsoft.com/office/drawing/2010/main" val="0"/>
@@ -14949,7 +15066,7 @@
           <p:nvPr/>
         </p:nvPicPr>
         <p:blipFill>
-          <a:blip r:embed="rId5">
+          <a:blip r:embed="rId6">
             <a:extLst>
               <a:ext uri="{28A0092B-C50C-407E-A947-70E740481C1C}">
                 <a14:useLocalDpi xmlns:a14="http://schemas.microsoft.com/office/drawing/2010/main" val="0"/>
@@ -14994,7 +15111,7 @@
           <p:nvPr/>
         </p:nvPicPr>
         <p:blipFill>
-          <a:blip r:embed="rId6">
+          <a:blip r:embed="rId7">
             <a:extLst>
               <a:ext uri="{28A0092B-C50C-407E-A947-70E740481C1C}">
                 <a14:useLocalDpi xmlns:a14="http://schemas.microsoft.com/office/drawing/2010/main" val="0"/>
@@ -15039,7 +15156,7 @@
           <p:nvPr/>
         </p:nvPicPr>
         <p:blipFill>
-          <a:blip r:embed="rId7"/>
+          <a:blip r:embed="rId8"/>
           <a:stretch>
             <a:fillRect/>
           </a:stretch>
@@ -15068,7 +15185,7 @@
           <p:nvPr/>
         </p:nvPicPr>
         <p:blipFill>
-          <a:blip r:embed="rId8" cstate="print">
+          <a:blip r:embed="rId9" cstate="print">
             <a:extLst>
               <a:ext uri="{28A0092B-C50C-407E-A947-70E740481C1C}">
                 <a14:useLocalDpi xmlns:a14="http://schemas.microsoft.com/office/drawing/2010/main" val="0"/>
@@ -20596,8 +20713,8 @@
           <a:lstStyle/>
           <a:p>
             <a:r>
-              <a:rPr lang="en-GB" dirty="0" err="1"/>
-              <a:t>Behavioral</a:t>
+              <a:rPr lang="bg-BG" dirty="0"/>
+              <a:t>Поведенчески</a:t>
             </a:r>
             <a:r>
               <a:rPr lang="en-GB" dirty="0"/>
@@ -21154,11 +21271,11 @@
           <a:p>
             <a:r>
               <a:rPr lang="bg-BG" dirty="0"/>
-              <a:t>Списък с </a:t>
+              <a:t>Списък с поведенчески</a:t>
             </a:r>
             <a:r>
               <a:rPr lang="en-US" dirty="0"/>
-              <a:t>Behavioral </a:t>
+              <a:t> </a:t>
             </a:r>
             <a:r>
               <a:rPr lang="bg-BG" dirty="0"/>
@@ -21952,11 +22069,11 @@
           <a:p>
             <a:r>
               <a:rPr lang="bg-BG" dirty="0"/>
-              <a:t>Списък с </a:t>
+              <a:t>Списък с поведенчески</a:t>
             </a:r>
             <a:r>
               <a:rPr lang="en-US" dirty="0"/>
-              <a:t>Behavioral </a:t>
+              <a:t> </a:t>
             </a:r>
             <a:r>
               <a:rPr lang="bg-BG" dirty="0"/>
@@ -27205,13 +27322,18 @@
               </a:lnSpc>
             </a:pPr>
             <a:r>
-              <a:rPr lang="en-US" sz="3400" dirty="0">
+              <a:rPr lang="bg-BG" sz="3400" dirty="0">
                 <a:solidFill>
                   <a:schemeClr val="bg2"/>
                 </a:solidFill>
               </a:rPr>
-              <a:t>Creational</a:t>
-            </a:r>
+              <a:t>За създаване</a:t>
+            </a:r>
+            <a:endParaRPr lang="en-US" sz="3400" dirty="0">
+              <a:solidFill>
+                <a:schemeClr val="bg2"/>
+              </a:solidFill>
+            </a:endParaRPr>
           </a:p>
           <a:p>
             <a:pPr lvl="1">
@@ -27220,13 +27342,18 @@
               </a:lnSpc>
             </a:pPr>
             <a:r>
-              <a:rPr lang="en-US" sz="3400" dirty="0">
+              <a:rPr lang="bg-BG" sz="3400" dirty="0">
                 <a:solidFill>
                   <a:schemeClr val="bg2"/>
                 </a:solidFill>
               </a:rPr>
-              <a:t>Structural</a:t>
-            </a:r>
+              <a:t>Структурни</a:t>
+            </a:r>
+            <a:endParaRPr lang="en-US" sz="3400" dirty="0">
+              <a:solidFill>
+                <a:schemeClr val="bg2"/>
+              </a:solidFill>
+            </a:endParaRPr>
           </a:p>
           <a:p>
             <a:pPr lvl="1">
@@ -27235,13 +27362,18 @@
               </a:lnSpc>
             </a:pPr>
             <a:r>
-              <a:rPr lang="en-US" sz="3400" dirty="0">
+              <a:rPr lang="bg-BG" sz="3400" dirty="0">
                 <a:solidFill>
                   <a:schemeClr val="bg2"/>
                 </a:solidFill>
               </a:rPr>
-              <a:t>Behavioral</a:t>
-            </a:r>
+              <a:t>Поведенчески</a:t>
+            </a:r>
+            <a:endParaRPr lang="en-US" sz="3400" dirty="0">
+              <a:solidFill>
+                <a:schemeClr val="bg2"/>
+              </a:solidFill>
+            </a:endParaRPr>
           </a:p>
         </p:txBody>
       </p:sp>
@@ -30409,22 +30541,22 @@
               </a:buClr>
             </a:pPr>
             <a:r>
-              <a:rPr lang="en-US" sz="3400" b="1" dirty="0">
+              <a:rPr lang="bg-BG" sz="3400" dirty="0"/>
+              <a:t>Шаблони за </a:t>
+            </a:r>
+            <a:r>
+              <a:rPr lang="bg-BG" sz="3400" b="1" dirty="0">
                 <a:solidFill>
                   <a:schemeClr val="bg1"/>
                 </a:solidFill>
               </a:rPr>
-              <a:t>Creational</a:t>
-            </a:r>
-            <a:r>
-              <a:rPr lang="en-US" sz="3400" dirty="0"/>
-              <a:t> </a:t>
-            </a:r>
-            <a:r>
-              <a:rPr lang="bg-BG" sz="3400" dirty="0"/>
-              <a:t>шаблони</a:t>
-            </a:r>
-            <a:endParaRPr lang="en-US" sz="3400" dirty="0"/>
+              <a:t>създаване</a:t>
+            </a:r>
+            <a:endParaRPr lang="en-US" sz="3400" dirty="0">
+              <a:solidFill>
+                <a:schemeClr val="bg1"/>
+              </a:solidFill>
+            </a:endParaRPr>
           </a:p>
           <a:p>
             <a:pPr marL="1066419" lvl="1" indent="-457200">
@@ -30511,12 +30643,12 @@
               </a:buClr>
             </a:pPr>
             <a:r>
-              <a:rPr lang="en-US" sz="3400" b="1" dirty="0">
+              <a:rPr lang="bg-BG" sz="3400" b="1" dirty="0">
                 <a:solidFill>
                   <a:schemeClr val="bg1"/>
                 </a:solidFill>
               </a:rPr>
-              <a:t>Structural</a:t>
+              <a:t>Структурни</a:t>
             </a:r>
             <a:r>
               <a:rPr lang="en-US" sz="3400" dirty="0"/>
@@ -30626,12 +30758,12 @@
               </a:buClr>
             </a:pPr>
             <a:r>
-              <a:rPr lang="en-US" sz="3400" b="1" dirty="0">
+              <a:rPr lang="bg-BG" sz="3400" b="1" dirty="0">
                 <a:solidFill>
                   <a:schemeClr val="bg1"/>
                 </a:solidFill>
               </a:rPr>
-              <a:t>Behavioral</a:t>
+              <a:t>Поведенчески</a:t>
             </a:r>
             <a:r>
               <a:rPr lang="en-US" sz="3400" dirty="0"/>

</xml_diff>